<commit_message>
it said I had to..
</commit_message>
<xml_diff>
--- a/full_mockup.pptx
+++ b/full_mockup.pptx
@@ -198,7 +198,7 @@
           <a:p>
             <a:fld id="{37536D00-DEAA-804B-B3E1-1F42B07B4846}" type="datetimeFigureOut">
               <a:rPr lang="en-US" smtClean="0"/>
-              <a:t>4/5/17</a:t>
+              <a:t>4/6/17</a:t>
             </a:fld>
             <a:endParaRPr lang="en-US"/>
           </a:p>
@@ -1298,7 +1298,7 @@
           <a:p>
             <a:fld id="{59B4A4A9-1795-944B-977D-92B2913FCDEC}" type="datetimeFigureOut">
               <a:rPr lang="en-US" smtClean="0"/>
-              <a:t>4/5/17</a:t>
+              <a:t>4/6/17</a:t>
             </a:fld>
             <a:endParaRPr lang="en-US"/>
           </a:p>
@@ -1468,7 +1468,7 @@
           <a:p>
             <a:fld id="{59B4A4A9-1795-944B-977D-92B2913FCDEC}" type="datetimeFigureOut">
               <a:rPr lang="en-US" smtClean="0"/>
-              <a:t>4/5/17</a:t>
+              <a:t>4/6/17</a:t>
             </a:fld>
             <a:endParaRPr lang="en-US"/>
           </a:p>
@@ -1648,7 +1648,7 @@
           <a:p>
             <a:fld id="{59B4A4A9-1795-944B-977D-92B2913FCDEC}" type="datetimeFigureOut">
               <a:rPr lang="en-US" smtClean="0"/>
-              <a:t>4/5/17</a:t>
+              <a:t>4/6/17</a:t>
             </a:fld>
             <a:endParaRPr lang="en-US"/>
           </a:p>
@@ -1818,7 +1818,7 @@
           <a:p>
             <a:fld id="{59B4A4A9-1795-944B-977D-92B2913FCDEC}" type="datetimeFigureOut">
               <a:rPr lang="en-US" smtClean="0"/>
-              <a:t>4/5/17</a:t>
+              <a:t>4/6/17</a:t>
             </a:fld>
             <a:endParaRPr lang="en-US"/>
           </a:p>
@@ -2064,7 +2064,7 @@
           <a:p>
             <a:fld id="{59B4A4A9-1795-944B-977D-92B2913FCDEC}" type="datetimeFigureOut">
               <a:rPr lang="en-US" smtClean="0"/>
-              <a:t>4/5/17</a:t>
+              <a:t>4/6/17</a:t>
             </a:fld>
             <a:endParaRPr lang="en-US"/>
           </a:p>
@@ -2352,7 +2352,7 @@
           <a:p>
             <a:fld id="{59B4A4A9-1795-944B-977D-92B2913FCDEC}" type="datetimeFigureOut">
               <a:rPr lang="en-US" smtClean="0"/>
-              <a:t>4/5/17</a:t>
+              <a:t>4/6/17</a:t>
             </a:fld>
             <a:endParaRPr lang="en-US"/>
           </a:p>
@@ -2774,7 +2774,7 @@
           <a:p>
             <a:fld id="{59B4A4A9-1795-944B-977D-92B2913FCDEC}" type="datetimeFigureOut">
               <a:rPr lang="en-US" smtClean="0"/>
-              <a:t>4/5/17</a:t>
+              <a:t>4/6/17</a:t>
             </a:fld>
             <a:endParaRPr lang="en-US"/>
           </a:p>
@@ -2892,7 +2892,7 @@
           <a:p>
             <a:fld id="{59B4A4A9-1795-944B-977D-92B2913FCDEC}" type="datetimeFigureOut">
               <a:rPr lang="en-US" smtClean="0"/>
-              <a:t>4/5/17</a:t>
+              <a:t>4/6/17</a:t>
             </a:fld>
             <a:endParaRPr lang="en-US"/>
           </a:p>
@@ -2987,7 +2987,7 @@
           <a:p>
             <a:fld id="{59B4A4A9-1795-944B-977D-92B2913FCDEC}" type="datetimeFigureOut">
               <a:rPr lang="en-US" smtClean="0"/>
-              <a:t>4/5/17</a:t>
+              <a:t>4/6/17</a:t>
             </a:fld>
             <a:endParaRPr lang="en-US"/>
           </a:p>
@@ -3264,7 +3264,7 @@
           <a:p>
             <a:fld id="{59B4A4A9-1795-944B-977D-92B2913FCDEC}" type="datetimeFigureOut">
               <a:rPr lang="en-US" smtClean="0"/>
-              <a:t>4/5/17</a:t>
+              <a:t>4/6/17</a:t>
             </a:fld>
             <a:endParaRPr lang="en-US"/>
           </a:p>
@@ -3517,7 +3517,7 @@
           <a:p>
             <a:fld id="{59B4A4A9-1795-944B-977D-92B2913FCDEC}" type="datetimeFigureOut">
               <a:rPr lang="en-US" smtClean="0"/>
-              <a:t>4/5/17</a:t>
+              <a:t>4/6/17</a:t>
             </a:fld>
             <a:endParaRPr lang="en-US"/>
           </a:p>
@@ -3730,7 +3730,7 @@
           <a:p>
             <a:fld id="{59B4A4A9-1795-944B-977D-92B2913FCDEC}" type="datetimeFigureOut">
               <a:rPr lang="en-US" smtClean="0"/>
-              <a:t>4/5/17</a:t>
+              <a:t>4/6/17</a:t>
             </a:fld>
             <a:endParaRPr lang="en-US"/>
           </a:p>
@@ -5471,7 +5471,7 @@
         <p:spPr>
           <a:xfrm flipH="1">
             <a:off x="2488457" y="5531627"/>
-            <a:ext cx="3843846" cy="0"/>
+            <a:ext cx="3843846" cy="400086"/>
           </a:xfrm>
           <a:prstGeom prst="straightConnector1">
             <a:avLst/>
@@ -5507,7 +5507,7 @@
         </p:nvSpPr>
         <p:spPr>
           <a:xfrm>
-            <a:off x="274175" y="5239239"/>
+            <a:off x="199421" y="5604535"/>
             <a:ext cx="2472471" cy="1077218"/>
           </a:xfrm>
           <a:prstGeom prst="rect">
@@ -5543,6 +5543,102 @@
                 <a:cs typeface="Quicksand Bold"/>
               </a:rPr>
               <a:t>ith phone</a:t>
+            </a:r>
+            <a:endParaRPr lang="en-US" sz="3200" dirty="0">
+              <a:latin typeface="Quicksand Bold"/>
+              <a:cs typeface="Quicksand Bold"/>
+            </a:endParaRPr>
+          </a:p>
+        </p:txBody>
+      </p:sp>
+      <p:cxnSp>
+        <p:nvCxnSpPr>
+          <p:cNvPr id="11" name="Straight Arrow Connector 10"/>
+          <p:cNvCxnSpPr/>
+          <p:nvPr/>
+        </p:nvCxnSpPr>
+        <p:spPr>
+          <a:xfrm flipH="1">
+            <a:off x="2278933" y="4744694"/>
+            <a:ext cx="4053370" cy="282477"/>
+          </a:xfrm>
+          <a:prstGeom prst="straightConnector1">
+            <a:avLst/>
+          </a:prstGeom>
+          <a:ln w="76200" cmpd="sng">
+            <a:solidFill>
+              <a:schemeClr val="tx1"/>
+            </a:solidFill>
+            <a:tailEnd type="arrow"/>
+          </a:ln>
+          <a:effectLst/>
+        </p:spPr>
+        <p:style>
+          <a:lnRef idx="2">
+            <a:schemeClr val="accent1"/>
+          </a:lnRef>
+          <a:fillRef idx="0">
+            <a:schemeClr val="accent1"/>
+          </a:fillRef>
+          <a:effectRef idx="1">
+            <a:schemeClr val="accent1"/>
+          </a:effectRef>
+          <a:fontRef idx="minor">
+            <a:schemeClr val="tx1"/>
+          </a:fontRef>
+        </p:style>
+      </p:cxnSp>
+      <p:sp>
+        <p:nvSpPr>
+          <p:cNvPr id="14" name="TextBox 13"/>
+          <p:cNvSpPr txBox="1"/>
+          <p:nvPr/>
+        </p:nvSpPr>
+        <p:spPr>
+          <a:xfrm>
+            <a:off x="121775" y="4527317"/>
+            <a:ext cx="2309144" cy="1077218"/>
+          </a:xfrm>
+          <a:prstGeom prst="rect">
+            <a:avLst/>
+          </a:prstGeom>
+          <a:noFill/>
+        </p:spPr>
+        <p:txBody>
+          <a:bodyPr wrap="none" rtlCol="0">
+            <a:spAutoFit/>
+          </a:bodyPr>
+          <a:lstStyle/>
+          <a:p>
+            <a:r>
+              <a:rPr lang="en-US" sz="3200" dirty="0" smtClean="0">
+                <a:latin typeface="Quicksand Bold"/>
+                <a:cs typeface="Quicksand Bold"/>
+              </a:rPr>
+              <a:t>Integrate </a:t>
+            </a:r>
+          </a:p>
+          <a:p>
+            <a:r>
+              <a:rPr lang="en-US" sz="3200" dirty="0">
+                <a:latin typeface="Quicksand Bold"/>
+                <a:cs typeface="Quicksand Bold"/>
+              </a:rPr>
+              <a:t>w</a:t>
+            </a:r>
+            <a:r>
+              <a:rPr lang="en-US" sz="3200" dirty="0" smtClean="0">
+                <a:latin typeface="Quicksand Bold"/>
+                <a:cs typeface="Quicksand Bold"/>
+              </a:rPr>
+              <a:t>ith </a:t>
+            </a:r>
+            <a:r>
+              <a:rPr lang="en-US" sz="3200" dirty="0" smtClean="0">
+                <a:latin typeface="Quicksand Bold"/>
+                <a:cs typeface="Quicksand Bold"/>
+              </a:rPr>
+              <a:t>maps</a:t>
             </a:r>
             <a:endParaRPr lang="en-US" sz="3200" dirty="0">
               <a:latin typeface="Quicksand Bold"/>

</xml_diff>